<commit_message>
Update gitbook 2025-02-04 16:41:01
</commit_message>
<xml_diff>
--- a/Week06/IntroductionToCss.pptx
+++ b/Week06/IntroductionToCss.pptx
@@ -5858,7 +5858,7 @@
           <a:p>
             <a:fld id="{5958763E-B898-436D-883D-03711491D54A}" type="datetimeFigureOut">
               <a:rPr lang="en-US" smtClean="0"/>
-              <a:t>9/4/2024</a:t>
+              <a:t>2/4/2025</a:t>
             </a:fld>
             <a:endParaRPr lang="en-US"/>
           </a:p>
@@ -7662,9 +7662,7 @@
             <a:r>
               <a:rPr lang="en-US" sz="2000" b="1" dirty="0">
                 <a:solidFill>
-                  <a:schemeClr val="bg1">
-                    <a:lumMod val="95000"/>
-                  </a:schemeClr>
+                  <a:schemeClr val="bg1"/>
                 </a:solidFill>
                 <a:hlinkClick r:id="rId3">
                   <a:extLst>
@@ -7674,13 +7672,11 @@
                   </a:extLst>
                 </a:hlinkClick>
               </a:rPr>
-              <a:t>https://glitch.com/edit/#!/trapezoidal-glorious-ragamuffin</a:t>
+              <a:t>https://glitch.com/edit/#!/oval-shared-wealth</a:t>
             </a:r>
             <a:endParaRPr lang="en-US" sz="2000" b="1" dirty="0">
               <a:solidFill>
-                <a:schemeClr val="bg1">
-                  <a:lumMod val="95000"/>
-                </a:schemeClr>
+                <a:schemeClr val="bg1"/>
               </a:solidFill>
             </a:endParaRPr>
           </a:p>

</xml_diff>